<commit_message>
Updated AICTE PPT Varsha.pptx
</commit_message>
<xml_diff>
--- a/AICTE PPT Varsha.pptx
+++ b/AICTE PPT Varsha.pptx
@@ -139,7 +139,7 @@
 <file path=ppt/revisionInfo.xml><?xml version="1.0" encoding="utf-8"?>
 <p1510:revInfo xmlns:a="http://schemas.openxmlformats.org/drawingml/2006/main" xmlns:r="http://schemas.openxmlformats.org/officeDocument/2006/relationships" xmlns:p1510="http://schemas.microsoft.com/office/powerpoint/2015/10/main">
   <p1510:revLst>
-    <p1510:client id="{73921C93-E4D2-862D-A910-6791F2C20888}" v="321" dt="2025-02-22T07:12:16.385"/>
+    <p1510:client id="{73921C93-E4D2-862D-A910-6791F2C20888}" v="335" dt="2025-02-22T07:35:05.170"/>
   </p1510:revLst>
 </p1510:revInfo>
 </file>
@@ -4998,24 +4998,14 @@
               <a:buNone/>
             </a:pPr>
             <a:r>
-              <a:rPr lang="en-IN" sz="3200">
+              <a:rPr lang="en-IN" sz="3200" dirty="0">
                 <a:solidFill>
                   <a:srgbClr val="0F0F0F"/>
                 </a:solidFill>
                 <a:ea typeface="+mn-lt"/>
                 <a:cs typeface="+mn-lt"/>
               </a:rPr>
-              <a:t>With</a:t>
-            </a:r>
-            <a:r>
-              <a:rPr lang="en-IN" sz="3200" dirty="0">
-                <a:solidFill>
-                  <a:srgbClr val="0F0F0F"/>
-                </a:solidFill>
-                <a:ea typeface="+mn-lt"/>
-                <a:cs typeface="+mn-lt"/>
-              </a:rPr>
-              <a:t> the rise in digital communication, ensuring secure data transmission is crucial. Traditional encryption methods may attract attention, making data susceptible to attacks. This project, </a:t>
+              <a:t>With the rise in digital communication, ensuring secure data transmission is crucial. Traditional encryption methods may attract attention, making data susceptible to attacks. This project, </a:t>
             </a:r>
             <a:r>
               <a:rPr lang="en-IN" sz="3200" b="1" dirty="0">
@@ -5035,17 +5025,7 @@
                 <a:ea typeface="+mn-lt"/>
                 <a:cs typeface="+mn-lt"/>
               </a:rPr>
-              <a:t>, focuses on embedding sensitive information within images, ensuring privacy and undetectability. By leveraging cryptographic techniques and steganography, this system provides a secure and efficient method for covert </a:t>
-            </a:r>
-            <a:r>
-              <a:rPr lang="en-IN" sz="3200">
-                <a:solidFill>
-                  <a:srgbClr val="0F0F0F"/>
-                </a:solidFill>
-                <a:ea typeface="+mn-lt"/>
-                <a:cs typeface="+mn-lt"/>
-              </a:rPr>
-              <a:t>communication.</a:t>
+              <a:t>, focuses on embedding sensitive information within images, ensuring privacy and undetectability. By leveraging cryptographic techniques and steganography, this system provides a secure and efficient method for covert communication.</a:t>
             </a:r>
             <a:endParaRPr lang="en-IN" dirty="0"/>
           </a:p>
@@ -5751,7 +5731,7 @@
           <a:p>
             <a:pPr marL="305435" indent="-305435"/>
             <a:r>
-              <a:rPr lang="en-IN"/>
+              <a:rPr lang="en-IN" dirty="0"/>
               <a:t>Intelligence Agencies</a:t>
             </a:r>
           </a:p>
@@ -5765,7 +5745,7 @@
           <a:p>
             <a:pPr marL="305435" indent="-305435"/>
             <a:r>
-              <a:rPr lang="en-IN"/>
+              <a:rPr lang="en-IN" dirty="0"/>
               <a:t>Corporations</a:t>
             </a:r>
           </a:p>
@@ -6030,20 +6010,13 @@
                 <a:ea typeface="+mn-lt"/>
                 <a:cs typeface="+mn-lt"/>
               </a:rPr>
-              <a:t>Secure Data Hiding in Images Using Steganography provides a reliable solution for covert communication and data </a:t>
-            </a:r>
-            <a:r>
-              <a:rPr lang="en-IN">
-                <a:ea typeface="+mn-lt"/>
-                <a:cs typeface="+mn-lt"/>
-              </a:rPr>
-              <a:t>security.</a:t>
+              <a:t>Secure Data Hiding in Images Using Steganography provides a reliable solution for covert communication and data security.</a:t>
             </a:r>
           </a:p>
           <a:p>
             <a:pPr marL="305435" indent="-305435"/>
             <a:r>
-              <a:rPr lang="en-IN">
+              <a:rPr lang="en-IN" dirty="0">
                 <a:ea typeface="+mn-lt"/>
                 <a:cs typeface="+mn-lt"/>
               </a:rPr>
@@ -6053,7 +6026,7 @@
           <a:p>
             <a:pPr marL="305435" indent="-305435"/>
             <a:r>
-              <a:rPr lang="en-IN">
+              <a:rPr lang="en-IN" dirty="0">
                 <a:ea typeface="+mn-lt"/>
                 <a:cs typeface="+mn-lt"/>
               </a:rPr>
@@ -6063,7 +6036,7 @@
           <a:p>
             <a:pPr marL="305435" indent="-305435"/>
             <a:r>
-              <a:rPr lang="en-IN">
+              <a:rPr lang="en-IN" dirty="0">
                 <a:ea typeface="+mn-lt"/>
                 <a:cs typeface="+mn-lt"/>
               </a:rPr>
@@ -6170,7 +6143,7 @@
               <a:buNone/>
             </a:pPr>
             <a:r>
-              <a:rPr lang="en-IN" u="sng" dirty="0">
+              <a:rPr lang="en-IN" dirty="0">
                 <a:solidFill>
                   <a:schemeClr val="accent5"/>
                 </a:solidFill>
@@ -6179,7 +6152,7 @@
               </a:rPr>
               <a:t>https://github.com/varshareddy1209/Secure-Data-Hiding-in-Images</a:t>
             </a:r>
-            <a:endParaRPr lang="en-US" u="sng" dirty="0">
+            <a:endParaRPr lang="en-US" dirty="0">
               <a:solidFill>
                 <a:schemeClr val="accent5"/>
               </a:solidFill>
@@ -6765,15 +6738,6 @@
 </file>
 
 <file path=customXml/item1.xml><?xml version="1.0" encoding="utf-8"?>
-<?mso-contentType ?>
-<FormTemplates xmlns="http://schemas.microsoft.com/sharepoint/v3/contenttype/forms">
-  <Display>DocumentLibraryForm</Display>
-  <Edit>DocumentLibraryForm</Edit>
-  <New>DocumentLibraryForm</New>
-</FormTemplates>
-</file>
-
-<file path=customXml/item2.xml><?xml version="1.0" encoding="utf-8"?>
 <ct:contentTypeSchema xmlns:ct="http://schemas.microsoft.com/office/2006/metadata/contentType" xmlns:ma="http://schemas.microsoft.com/office/2006/metadata/properties/metaAttributes" ct:_="" ma:_="" ma:contentTypeName="Document" ma:contentTypeID="0x0101007F0268AC5E70984D8FE60B7154176407" ma:contentTypeVersion="15" ma:contentTypeDescription="Create a new document." ma:contentTypeScope="" ma:versionID="104e359103f0f57b1cf9676756e5b944">
   <xsd:schema xmlns:xsd="http://www.w3.org/2001/XMLSchema" xmlns:xs="http://www.w3.org/2001/XMLSchema" xmlns:p="http://schemas.microsoft.com/office/2006/metadata/properties" xmlns:ns3="b30265f8-c5e2-4918-b4a1-b977299ca3e2" xmlns:ns4="fadb41d3-f9cb-40fb-903c-8cacaba95bb5" targetNamespace="http://schemas.microsoft.com/office/2006/metadata/properties" ma:root="true" ma:fieldsID="5615b8f8aa772998bad551f24a33de0e" ns3:_="" ns4:_="">
     <xsd:import namespace="b30265f8-c5e2-4918-b4a1-b977299ca3e2"/>
@@ -7006,6 +6970,15 @@
 </ct:contentTypeSchema>
 </file>
 
+<file path=customXml/item2.xml><?xml version="1.0" encoding="utf-8"?>
+<?mso-contentType ?>
+<FormTemplates xmlns="http://schemas.microsoft.com/sharepoint/v3/contenttype/forms">
+  <Display>DocumentLibraryForm</Display>
+  <Edit>DocumentLibraryForm</Edit>
+  <New>DocumentLibraryForm</New>
+</FormTemplates>
+</file>
+
 <file path=customXml/item3.xml><?xml version="1.0" encoding="utf-8"?>
 <p:properties xmlns:p="http://schemas.microsoft.com/office/2006/metadata/properties" xmlns:xsi="http://www.w3.org/2001/XMLSchema-instance" xmlns:pc="http://schemas.microsoft.com/office/infopath/2007/PartnerControls">
   <documentManagement>
@@ -7015,14 +6988,6 @@
 </file>
 
 <file path=customXml/itemProps1.xml><?xml version="1.0" encoding="utf-8"?>
-<ds:datastoreItem xmlns:ds="http://schemas.openxmlformats.org/officeDocument/2006/customXml" ds:itemID="{927BD4C1-B6B1-4715-ABF9-E660A51A4EA0}">
-  <ds:schemaRefs>
-    <ds:schemaRef ds:uri="http://schemas.microsoft.com/sharepoint/v3/contenttype/forms"/>
-  </ds:schemaRefs>
-</ds:datastoreItem>
-</file>
-
-<file path=customXml/itemProps2.xml><?xml version="1.0" encoding="utf-8"?>
 <ds:datastoreItem xmlns:ds="http://schemas.openxmlformats.org/officeDocument/2006/customXml" ds:itemID="{9DD71778-17EE-4151-88AE-C8F4E8043BD9}">
   <ds:schemaRefs>
     <ds:schemaRef ds:uri="http://schemas.microsoft.com/office/2006/metadata/contentType"/>
@@ -7037,6 +7002,14 @@
     <ds:schemaRef ds:uri="http://purl.org/dc/elements/1.1/"/>
     <ds:schemaRef ds:uri="http://purl.org/dc/terms/"/>
     <ds:schemaRef ds:uri="http://schemas.microsoft.com/internal/obd"/>
+  </ds:schemaRefs>
+</ds:datastoreItem>
+</file>
+
+<file path=customXml/itemProps2.xml><?xml version="1.0" encoding="utf-8"?>
+<ds:datastoreItem xmlns:ds="http://schemas.openxmlformats.org/officeDocument/2006/customXml" ds:itemID="{927BD4C1-B6B1-4715-ABF9-E660A51A4EA0}">
+  <ds:schemaRefs>
+    <ds:schemaRef ds:uri="http://schemas.microsoft.com/sharepoint/v3/contenttype/forms"/>
   </ds:schemaRefs>
 </ds:datastoreItem>
 </file>

</xml_diff>